<commit_message>
fixed some typos after teaching
</commit_message>
<xml_diff>
--- a/node/lesson-59-express/express.pptx
+++ b/node/lesson-59-express/express.pptx
@@ -5942,8 +5942,44 @@
             <a:pPr lvl="1"/>
             <a:r>
               <a:rPr lang="en-US" dirty="0" smtClean="0"/>
-              <a:t>Values are objects with metadata about uploaded file</a:t>
-            </a:r>
+              <a:t>Values are objects with metadata about uploaded </a:t>
+            </a:r>
+            <a:r>
+              <a:rPr lang="en-US" dirty="0" smtClean="0"/>
+              <a:t>file</a:t>
+            </a:r>
+          </a:p>
+          <a:p>
+            <a:pPr lvl="1"/>
+            <a:r>
+              <a:rPr lang="en-US" dirty="0" smtClean="0"/>
+              <a:t>Example: &lt;input </a:t>
+            </a:r>
+            <a:r>
+              <a:rPr lang="en-US" dirty="0" smtClean="0">
+                <a:solidFill>
+                  <a:srgbClr val="FF0000"/>
+                </a:solidFill>
+              </a:rPr>
+              <a:t>type</a:t>
+            </a:r>
+            <a:r>
+              <a:rPr lang="en-US" dirty="0" smtClean="0"/>
+              <a:t>=‘file’ </a:t>
+            </a:r>
+            <a:r>
+              <a:rPr lang="en-US" dirty="0" smtClean="0">
+                <a:solidFill>
+                  <a:srgbClr val="FF0000"/>
+                </a:solidFill>
+              </a:rPr>
+              <a:t>name</a:t>
+            </a:r>
+            <a:r>
+              <a:rPr lang="en-US" dirty="0" smtClean="0"/>
+              <a:t>=‘invoice’ /&gt;</a:t>
+            </a:r>
+            <a:endParaRPr lang="en-US" dirty="0" smtClean="0"/>
           </a:p>
         </p:txBody>
       </p:sp>
@@ -6055,7 +6091,29 @@
                 <a:ea typeface="Monaco"/>
                 <a:cs typeface="Monaco"/>
               </a:rPr>
-              <a:t>req.files.invoice.path</a:t>
+              <a:t>req.files.</a:t>
+            </a:r>
+            <a:r>
+              <a:rPr lang="en-US" sz="1400" dirty="0" err="1">
+                <a:solidFill>
+                  <a:srgbClr val="FF0000"/>
+                </a:solidFill>
+                <a:latin typeface="Monaco"/>
+                <a:ea typeface="Monaco"/>
+                <a:cs typeface="Monaco"/>
+              </a:rPr>
+              <a:t>invoice</a:t>
+            </a:r>
+            <a:r>
+              <a:rPr lang="en-US" sz="1400" dirty="0" err="1">
+                <a:solidFill>
+                  <a:srgbClr val="000000"/>
+                </a:solidFill>
+                <a:latin typeface="Monaco"/>
+                <a:ea typeface="Monaco"/>
+                <a:cs typeface="Monaco"/>
+              </a:rPr>
+              <a:t>.path</a:t>
             </a:r>
             <a:r>
               <a:rPr lang="en-US" sz="1400" dirty="0">
@@ -6311,7 +6369,29 @@
                 <a:ea typeface="Monaco"/>
                 <a:cs typeface="Monaco"/>
               </a:rPr>
-              <a:t>req.files.invoice.name</a:t>
+              <a:t>req.files.</a:t>
+            </a:r>
+            <a:r>
+              <a:rPr lang="en-US" sz="1400" dirty="0" err="1">
+                <a:solidFill>
+                  <a:srgbClr val="FF0000"/>
+                </a:solidFill>
+                <a:latin typeface="Monaco"/>
+                <a:ea typeface="Monaco"/>
+                <a:cs typeface="Monaco"/>
+              </a:rPr>
+              <a:t>invoice</a:t>
+            </a:r>
+            <a:r>
+              <a:rPr lang="en-US" sz="1400" dirty="0" err="1">
+                <a:solidFill>
+                  <a:srgbClr val="000000"/>
+                </a:solidFill>
+                <a:latin typeface="Monaco"/>
+                <a:ea typeface="Monaco"/>
+                <a:cs typeface="Monaco"/>
+              </a:rPr>
+              <a:t>.name</a:t>
             </a:r>
             <a:r>
               <a:rPr lang="en-US" sz="1400" dirty="0">
@@ -11656,12 +11736,19 @@
             </a:r>
             <a:r>
               <a:rPr lang="en-US" sz="2000" dirty="0" smtClean="0">
+                <a:solidFill>
+                  <a:srgbClr val="FF0000"/>
+                </a:solidFill>
                 <a:latin typeface="Monaco"/>
                 <a:cs typeface="Monaco"/>
               </a:rPr>
               <a:t>next()</a:t>
             </a:r>
-            <a:endParaRPr lang="en-US" dirty="0"/>
+            <a:endParaRPr lang="en-US" dirty="0">
+              <a:solidFill>
+                <a:srgbClr val="FF0000"/>
+              </a:solidFill>
+            </a:endParaRPr>
           </a:p>
           <a:p>
             <a:r>

</xml_diff>

<commit_message>
Added pages on app, req, and res properties
</commit_message>
<xml_diff>
--- a/node/lesson-59-express/express.pptx
+++ b/node/lesson-59-express/express.pptx
@@ -5,10 +5,10 @@
     <p:sldMasterId id="2147483648" r:id="rId1"/>
   </p:sldMasterIdLst>
   <p:notesMasterIdLst>
-    <p:notesMasterId r:id="rId25"/>
+    <p:notesMasterId r:id="rId28"/>
   </p:notesMasterIdLst>
   <p:handoutMasterIdLst>
-    <p:handoutMasterId r:id="rId26"/>
+    <p:handoutMasterId r:id="rId29"/>
   </p:handoutMasterIdLst>
   <p:sldIdLst>
     <p:sldId id="298" r:id="rId2"/>
@@ -33,12 +33,15 @@
     <p:sldId id="339" r:id="rId21"/>
     <p:sldId id="340" r:id="rId22"/>
     <p:sldId id="341" r:id="rId23"/>
-    <p:sldId id="342" r:id="rId24"/>
+    <p:sldId id="349" r:id="rId24"/>
+    <p:sldId id="350" r:id="rId25"/>
+    <p:sldId id="352" r:id="rId26"/>
+    <p:sldId id="342" r:id="rId27"/>
   </p:sldIdLst>
   <p:sldSz cx="9144000" cy="6858000" type="screen4x3"/>
   <p:notesSz cx="6858000" cy="9144000"/>
   <p:custDataLst>
-    <p:tags r:id="rId28"/>
+    <p:tags r:id="rId30"/>
   </p:custDataLst>
   <p:defaultTextStyle>
     <a:defPPr>
@@ -135,6 +138,71 @@
       </a:defRPr>
     </a:lvl9pPr>
   </p:defaultTextStyle>
+  <p:extLst>
+    <p:ext uri="{EFAFB233-063F-42B5-8137-9DF3F51BA10A}">
+      <p15:sldGuideLst xmlns:p15="http://schemas.microsoft.com/office/powerpoint/2012/main">
+        <p15:guide id="1" orient="horz" pos="4176">
+          <p15:clr>
+            <a:srgbClr val="A4A3A4"/>
+          </p15:clr>
+        </p15:guide>
+        <p15:guide id="2" orient="horz" pos="607">
+          <p15:clr>
+            <a:srgbClr val="A4A3A4"/>
+          </p15:clr>
+        </p15:guide>
+        <p15:guide id="3" orient="horz" pos="212">
+          <p15:clr>
+            <a:srgbClr val="A4A3A4"/>
+          </p15:clr>
+        </p15:guide>
+        <p15:guide id="4" orient="horz" pos="912">
+          <p15:clr>
+            <a:srgbClr val="A4A3A4"/>
+          </p15:clr>
+        </p15:guide>
+        <p15:guide id="5" orient="horz" pos="3969">
+          <p15:clr>
+            <a:srgbClr val="A4A3A4"/>
+          </p15:clr>
+        </p15:guide>
+        <p15:guide id="6" pos="1267">
+          <p15:clr>
+            <a:srgbClr val="A4A3A4"/>
+          </p15:clr>
+        </p15:guide>
+        <p15:guide id="7" pos="382">
+          <p15:clr>
+            <a:srgbClr val="A4A3A4"/>
+          </p15:clr>
+        </p15:guide>
+        <p15:guide id="8" pos="2880">
+          <p15:clr>
+            <a:srgbClr val="A4A3A4"/>
+          </p15:clr>
+        </p15:guide>
+        <p15:guide id="9" pos="5568">
+          <p15:clr>
+            <a:srgbClr val="A4A3A4"/>
+          </p15:clr>
+        </p15:guide>
+      </p15:sldGuideLst>
+    </p:ext>
+    <p:ext uri="{2D200454-40CA-4A62-9FC3-DE9A4176ACB9}">
+      <p15:notesGuideLst xmlns:p15="http://schemas.microsoft.com/office/powerpoint/2012/main">
+        <p15:guide id="1" orient="horz" pos="2880">
+          <p15:clr>
+            <a:srgbClr val="A4A3A4"/>
+          </p15:clr>
+        </p15:guide>
+        <p15:guide id="2" pos="2160">
+          <p15:clr>
+            <a:srgbClr val="A4A3A4"/>
+          </p15:clr>
+        </p15:guide>
+      </p15:notesGuideLst>
+    </p:ext>
+  </p:extLst>
 </p:presentation>
 </file>
 
@@ -730,7 +798,7 @@
             <a:fld id="{6AFC80D5-740B-4CAF-B407-EC08971373CE}" type="slidenum">
               <a:rPr lang="en-US" smtClean="0"/>
               <a:pPr/>
-              <a:t>23</a:t>
+              <a:t>26</a:t>
             </a:fld>
             <a:endParaRPr lang="en-US" dirty="0"/>
           </a:p>
@@ -1153,7 +1221,7 @@
   <p:timing>
     <p:tnLst>
       <p:par>
-        <p:cTn xmlns:p14="http://schemas.microsoft.com/office/powerpoint/2010/main" id="1" dur="indefinite" restart="never" nodeType="tmRoot"/>
+        <p:cTn id="1" dur="indefinite" restart="never" nodeType="tmRoot"/>
       </p:par>
     </p:tnLst>
   </p:timing>
@@ -1209,7 +1277,7 @@
           <a:noFill/>
           <a:extLst>
             <a:ext uri="{909E8E84-426E-40dd-AFC4-6F175D3DCCD1}">
-              <a14:hiddenFill xmlns:a14="http://schemas.microsoft.com/office/drawing/2010/main">
+              <a14:hiddenFill xmlns:a14="http://schemas.microsoft.com/office/drawing/2010/main" xmlns="">
                 <a:solidFill>
                   <a:srgbClr val="FFFFFF"/>
                 </a:solidFill>
@@ -1364,7 +1432,7 @@
   <p:timing>
     <p:tnLst>
       <p:par>
-        <p:cTn xmlns:p14="http://schemas.microsoft.com/office/powerpoint/2010/main" id="1" dur="indefinite" restart="never" nodeType="tmRoot"/>
+        <p:cTn id="1" dur="indefinite" restart="never" nodeType="tmRoot"/>
       </p:par>
     </p:tnLst>
   </p:timing>
@@ -1819,7 +1887,7 @@
   <p:timing>
     <p:tnLst>
       <p:par>
-        <p:cTn xmlns:p14="http://schemas.microsoft.com/office/powerpoint/2010/main" id="1" dur="indefinite" restart="never" nodeType="tmRoot"/>
+        <p:cTn id="1" dur="indefinite" restart="never" nodeType="tmRoot"/>
       </p:par>
     </p:tnLst>
   </p:timing>
@@ -2159,7 +2227,7 @@
   <p:timing>
     <p:tnLst>
       <p:par>
-        <p:cTn xmlns:p14="http://schemas.microsoft.com/office/powerpoint/2010/main" id="1" dur="indefinite" restart="never" nodeType="tmRoot"/>
+        <p:cTn id="1" dur="indefinite" restart="never" nodeType="tmRoot"/>
       </p:par>
     </p:tnLst>
   </p:timing>
@@ -2647,7 +2715,7 @@
   <p:timing>
     <p:tnLst>
       <p:par>
-        <p:cTn xmlns:p14="http://schemas.microsoft.com/office/powerpoint/2010/main" id="1" dur="indefinite" restart="never" nodeType="tmRoot"/>
+        <p:cTn id="1" dur="indefinite" restart="never" nodeType="tmRoot"/>
       </p:par>
     </p:tnLst>
   </p:timing>
@@ -3008,7 +3076,7 @@
   <p:timing>
     <p:tnLst>
       <p:par>
-        <p:cTn xmlns:p14="http://schemas.microsoft.com/office/powerpoint/2010/main" id="1" dur="indefinite" restart="never" nodeType="tmRoot"/>
+        <p:cTn id="1" dur="indefinite" restart="never" nodeType="tmRoot"/>
       </p:par>
     </p:tnLst>
   </p:timing>
@@ -3518,7 +3586,7 @@
   <p:timing>
     <p:tnLst>
       <p:par>
-        <p:cTn xmlns:p14="http://schemas.microsoft.com/office/powerpoint/2010/main" id="1" dur="indefinite" restart="never" nodeType="tmRoot"/>
+        <p:cTn id="1" dur="indefinite" restart="never" nodeType="tmRoot"/>
       </p:par>
     </p:tnLst>
   </p:timing>
@@ -3956,7 +4024,7 @@
   <p:timing>
     <p:tnLst>
       <p:par>
-        <p:cTn xmlns:p14="http://schemas.microsoft.com/office/powerpoint/2010/main" id="1" dur="indefinite" restart="never" nodeType="tmRoot"/>
+        <p:cTn id="1" dur="indefinite" restart="never" nodeType="tmRoot"/>
       </p:par>
     </p:tnLst>
   </p:timing>
@@ -4462,7 +4530,7 @@
   <p:timing>
     <p:tnLst>
       <p:par>
-        <p:cTn xmlns:p14="http://schemas.microsoft.com/office/powerpoint/2010/main" id="1" dur="indefinite" restart="never" nodeType="tmRoot"/>
+        <p:cTn id="1" dur="indefinite" restart="never" nodeType="tmRoot"/>
       </p:par>
     </p:tnLst>
   </p:timing>
@@ -4684,7 +4752,7 @@
   <p:timing>
     <p:tnLst>
       <p:par>
-        <p:cTn xmlns:p14="http://schemas.microsoft.com/office/powerpoint/2010/main" id="1" dur="indefinite" restart="never" nodeType="tmRoot"/>
+        <p:cTn id="1" dur="indefinite" restart="never" nodeType="tmRoot"/>
       </p:par>
     </p:tnLst>
   </p:timing>
@@ -5121,7 +5189,7 @@
   <p:timing>
     <p:tnLst>
       <p:par>
-        <p:cTn xmlns:p14="http://schemas.microsoft.com/office/powerpoint/2010/main" id="1" dur="indefinite" restart="never" nodeType="tmRoot"/>
+        <p:cTn id="1" dur="indefinite" restart="never" nodeType="tmRoot"/>
       </p:par>
     </p:tnLst>
   </p:timing>
@@ -5412,7 +5480,7 @@
   <p:timing>
     <p:tnLst>
       <p:par>
-        <p:cTn xmlns:p14="http://schemas.microsoft.com/office/powerpoint/2010/main" id="1" dur="indefinite" restart="never" nodeType="tmRoot"/>
+        <p:cTn id="1" dur="indefinite" restart="never" nodeType="tmRoot"/>
       </p:par>
     </p:tnLst>
   </p:timing>
@@ -5866,7 +5934,7 @@
   <p:timing>
     <p:tnLst>
       <p:par>
-        <p:cTn xmlns:p14="http://schemas.microsoft.com/office/powerpoint/2010/main" id="1" dur="indefinite" restart="never" nodeType="tmRoot"/>
+        <p:cTn id="1" dur="indefinite" restart="never" nodeType="tmRoot"/>
       </p:par>
     </p:tnLst>
   </p:timing>
@@ -6000,15 +6068,7 @@
                   <a:srgbClr val="0000FF"/>
                 </a:solidFill>
               </a:rPr>
-              <a:t>’ /</a:t>
-            </a:r>
-            <a:r>
-              <a:rPr lang="en-US" dirty="0" smtClean="0">
-                <a:solidFill>
-                  <a:srgbClr val="0000FF"/>
-                </a:solidFill>
-              </a:rPr>
-              <a:t>&gt;</a:t>
+              <a:t>’ /&gt;</a:t>
             </a:r>
           </a:p>
           <a:p>
@@ -6785,7 +6845,7 @@
   <p:timing>
     <p:tnLst>
       <p:par>
-        <p:cTn xmlns:p14="http://schemas.microsoft.com/office/powerpoint/2010/main" id="1" dur="indefinite" restart="never" nodeType="tmRoot"/>
+        <p:cTn id="1" dur="indefinite" restart="never" nodeType="tmRoot"/>
       </p:par>
     </p:tnLst>
   </p:timing>
@@ -6980,7 +7040,7 @@
   <p:timing>
     <p:tnLst>
       <p:par>
-        <p:cTn xmlns:p14="http://schemas.microsoft.com/office/powerpoint/2010/main" id="1" dur="indefinite" restart="never" nodeType="tmRoot"/>
+        <p:cTn id="1" dur="indefinite" restart="never" nodeType="tmRoot"/>
       </p:par>
     </p:tnLst>
   </p:timing>
@@ -8348,7 +8408,7 @@
   <p:timing>
     <p:tnLst>
       <p:par>
-        <p:cTn xmlns:p14="http://schemas.microsoft.com/office/powerpoint/2010/main" id="1" dur="indefinite" restart="never" nodeType="tmRoot"/>
+        <p:cTn id="1" dur="indefinite" restart="never" nodeType="tmRoot"/>
       </p:par>
     </p:tnLst>
   </p:timing>
@@ -8537,7 +8597,7 @@
   <p:timing>
     <p:tnLst>
       <p:par>
-        <p:cTn xmlns:p14="http://schemas.microsoft.com/office/powerpoint/2010/main" id="1" dur="indefinite" restart="never" nodeType="tmRoot"/>
+        <p:cTn id="1" dur="indefinite" restart="never" nodeType="tmRoot"/>
       </p:par>
     </p:tnLst>
   </p:timing>
@@ -8947,7 +9007,7 @@
   <p:timing>
     <p:tnLst>
       <p:par>
-        <p:cTn xmlns:p14="http://schemas.microsoft.com/office/powerpoint/2010/main" id="1" dur="indefinite" restart="never" nodeType="tmRoot"/>
+        <p:cTn id="1" dur="indefinite" restart="never" nodeType="tmRoot"/>
       </p:par>
     </p:tnLst>
   </p:timing>
@@ -9321,7 +9381,7 @@
   <p:timing>
     <p:tnLst>
       <p:par>
-        <p:cTn xmlns:p14="http://schemas.microsoft.com/office/powerpoint/2010/main" id="1" dur="indefinite" restart="never" nodeType="tmRoot"/>
+        <p:cTn id="1" dur="indefinite" restart="never" nodeType="tmRoot"/>
       </p:par>
     </p:tnLst>
   </p:timing>
@@ -9585,7 +9645,7 @@
   <p:timing>
     <p:tnLst>
       <p:par>
-        <p:cTn xmlns:p14="http://schemas.microsoft.com/office/powerpoint/2010/main" id="1" dur="indefinite" restart="never" nodeType="tmRoot"/>
+        <p:cTn id="1" dur="indefinite" restart="never" nodeType="tmRoot"/>
       </p:par>
     </p:tnLst>
   </p:timing>
@@ -9593,6 +9653,984 @@
 </file>
 
 <file path=ppt/slides/slide23.xml><?xml version="1.0" encoding="utf-8"?>
+<p:sld xmlns:a="http://schemas.openxmlformats.org/drawingml/2006/main" xmlns:r="http://schemas.openxmlformats.org/officeDocument/2006/relationships" xmlns:p="http://schemas.openxmlformats.org/presentationml/2006/main">
+  <p:cSld>
+    <p:spTree>
+      <p:nvGrpSpPr>
+        <p:cNvPr id="1" name=""/>
+        <p:cNvGrpSpPr/>
+        <p:nvPr/>
+      </p:nvGrpSpPr>
+      <p:grpSpPr>
+        <a:xfrm>
+          <a:off x="0" y="0"/>
+          <a:ext cx="0" cy="0"/>
+          <a:chOff x="0" y="0"/>
+          <a:chExt cx="0" cy="0"/>
+        </a:xfrm>
+      </p:grpSpPr>
+      <p:sp>
+        <p:nvSpPr>
+          <p:cNvPr id="3" name="Content Placeholder 2"/>
+          <p:cNvSpPr>
+            <a:spLocks noGrp="1"/>
+          </p:cNvSpPr>
+          <p:nvPr>
+            <p:ph type="body" sz="quarter" idx="12"/>
+          </p:nvPr>
+        </p:nvSpPr>
+        <p:spPr/>
+        <p:txBody>
+          <a:bodyPr/>
+          <a:lstStyle/>
+          <a:p>
+            <a:r>
+              <a:rPr lang="en-US" dirty="0" smtClean="0"/>
+              <a:t>These are properties on the express app.</a:t>
+            </a:r>
+          </a:p>
+          <a:p>
+            <a:r>
+              <a:rPr lang="en-US" dirty="0" smtClean="0"/>
+              <a:t>For </a:t>
+            </a:r>
+            <a:r>
+              <a:rPr lang="en-US" dirty="0" err="1" smtClean="0">
+                <a:solidFill>
+                  <a:srgbClr val="FF0000"/>
+                </a:solidFill>
+              </a:rPr>
+              <a:t>app.locals</a:t>
+            </a:r>
+            <a:r>
+              <a:rPr lang="en-US" dirty="0" smtClean="0">
+                <a:solidFill>
+                  <a:srgbClr val="FF0000"/>
+                </a:solidFill>
+              </a:rPr>
+              <a:t> </a:t>
+            </a:r>
+            <a:r>
+              <a:rPr lang="en-US" dirty="0" smtClean="0"/>
+              <a:t>: { }  // has of properties</a:t>
+            </a:r>
+          </a:p>
+          <a:p>
+            <a:pPr lvl="1"/>
+            <a:r>
+              <a:rPr lang="en-US" dirty="0" smtClean="0"/>
+              <a:t>Data available for all users, all pages</a:t>
+            </a:r>
+          </a:p>
+          <a:p>
+            <a:r>
+              <a:rPr lang="en-US" dirty="0" smtClean="0"/>
+              <a:t>For </a:t>
+            </a:r>
+            <a:r>
+              <a:rPr lang="en-US" dirty="0" err="1" smtClean="0">
+                <a:solidFill>
+                  <a:srgbClr val="FF0000"/>
+                </a:solidFill>
+              </a:rPr>
+              <a:t>app.mountpath</a:t>
+            </a:r>
+            <a:r>
+              <a:rPr lang="en-US" dirty="0" smtClean="0">
+                <a:solidFill>
+                  <a:srgbClr val="FF0000"/>
+                </a:solidFill>
+              </a:rPr>
+              <a:t> </a:t>
+            </a:r>
+            <a:r>
+              <a:rPr lang="en-US" dirty="0" smtClean="0"/>
+              <a:t>: String</a:t>
+            </a:r>
+          </a:p>
+          <a:p>
+            <a:pPr lvl="1"/>
+            <a:r>
+              <a:rPr lang="en-US" dirty="0" smtClean="0"/>
+              <a:t>Current </a:t>
+            </a:r>
+            <a:r>
+              <a:rPr lang="en-US" dirty="0" err="1" smtClean="0"/>
+              <a:t>mountpath</a:t>
+            </a:r>
+            <a:r>
+              <a:rPr lang="en-US" dirty="0" smtClean="0"/>
+              <a:t> for the middleware component</a:t>
+            </a:r>
+          </a:p>
+          <a:p>
+            <a:pPr lvl="1"/>
+            <a:endParaRPr lang="en-US" dirty="0"/>
+          </a:p>
+        </p:txBody>
+      </p:sp>
+      <p:sp>
+        <p:nvSpPr>
+          <p:cNvPr id="2" name="Title 1"/>
+          <p:cNvSpPr>
+            <a:spLocks noGrp="1"/>
+          </p:cNvSpPr>
+          <p:nvPr>
+            <p:ph type="title"/>
+          </p:nvPr>
+        </p:nvSpPr>
+        <p:spPr/>
+        <p:txBody>
+          <a:bodyPr/>
+          <a:lstStyle/>
+          <a:p>
+            <a:r>
+              <a:rPr lang="en-US" dirty="0" smtClean="0"/>
+              <a:t>App properties</a:t>
+            </a:r>
+            <a:endParaRPr lang="en-US" dirty="0"/>
+          </a:p>
+        </p:txBody>
+      </p:sp>
+      <p:sp>
+        <p:nvSpPr>
+          <p:cNvPr id="4" name="Slide Number Placeholder 3"/>
+          <p:cNvSpPr>
+            <a:spLocks noGrp="1"/>
+          </p:cNvSpPr>
+          <p:nvPr>
+            <p:ph type="sldNum" sz="quarter" idx="4294967295"/>
+          </p:nvPr>
+        </p:nvSpPr>
+        <p:spPr>
+          <a:xfrm>
+            <a:off x="8237538" y="6553200"/>
+            <a:ext cx="906462" cy="457200"/>
+          </a:xfrm>
+          <a:prstGeom prst="rect">
+            <a:avLst/>
+          </a:prstGeom>
+        </p:spPr>
+        <p:txBody>
+          <a:bodyPr/>
+          <a:lstStyle/>
+          <a:p>
+            <a:fld id="{0D854ACF-EFF3-42D3-AB5F-408268493A1F}" type="slidenum">
+              <a:rPr lang="en-US" smtClean="0"/>
+              <a:pPr/>
+              <a:t>23</a:t>
+            </a:fld>
+            <a:endParaRPr lang="en-US" dirty="0"/>
+          </a:p>
+        </p:txBody>
+      </p:sp>
+    </p:spTree>
+    <p:extLst>
+      <p:ext uri="{BB962C8B-B14F-4D97-AF65-F5344CB8AC3E}">
+        <p14:creationId xmlns:p14="http://schemas.microsoft.com/office/powerpoint/2010/main" val="348259297"/>
+      </p:ext>
+    </p:extLst>
+  </p:cSld>
+  <p:clrMapOvr>
+    <a:masterClrMapping/>
+  </p:clrMapOvr>
+  <mc:AlternateContent xmlns:mc="http://schemas.openxmlformats.org/markup-compatibility/2006" xmlns:p14="http://schemas.microsoft.com/office/powerpoint/2010/main">
+    <mc:Choice Requires="p14">
+      <p:transition p14:dur="0"/>
+    </mc:Choice>
+    <mc:Fallback xmlns="">
+      <p:transition/>
+    </mc:Fallback>
+  </mc:AlternateContent>
+  <p:timing>
+    <p:tnLst>
+      <p:par>
+        <p:cTn id="1" dur="indefinite" restart="never" nodeType="tmRoot"/>
+      </p:par>
+    </p:tnLst>
+  </p:timing>
+</p:sld>
+</file>
+
+<file path=ppt/slides/slide24.xml><?xml version="1.0" encoding="utf-8"?>
+<p:sld xmlns:a="http://schemas.openxmlformats.org/drawingml/2006/main" xmlns:r="http://schemas.openxmlformats.org/officeDocument/2006/relationships" xmlns:p="http://schemas.openxmlformats.org/presentationml/2006/main">
+  <p:cSld>
+    <p:spTree>
+      <p:nvGrpSpPr>
+        <p:cNvPr id="1" name=""/>
+        <p:cNvGrpSpPr/>
+        <p:nvPr/>
+      </p:nvGrpSpPr>
+      <p:grpSpPr>
+        <a:xfrm>
+          <a:off x="0" y="0"/>
+          <a:ext cx="0" cy="0"/>
+          <a:chOff x="0" y="0"/>
+          <a:chExt cx="0" cy="0"/>
+        </a:xfrm>
+      </p:grpSpPr>
+      <p:sp>
+        <p:nvSpPr>
+          <p:cNvPr id="3" name="Content Placeholder 2"/>
+          <p:cNvSpPr>
+            <a:spLocks noGrp="1"/>
+          </p:cNvSpPr>
+          <p:nvPr>
+            <p:ph type="body" sz="quarter" idx="12"/>
+          </p:nvPr>
+        </p:nvSpPr>
+        <p:spPr/>
+        <p:txBody>
+          <a:bodyPr/>
+          <a:lstStyle/>
+          <a:p>
+            <a:r>
+              <a:rPr lang="en-US" dirty="0" smtClean="0"/>
+              <a:t>These are properties on the </a:t>
+            </a:r>
+            <a:r>
+              <a:rPr lang="en-US" dirty="0" err="1" smtClean="0"/>
+              <a:t>req</a:t>
+            </a:r>
+            <a:r>
+              <a:rPr lang="en-US" dirty="0" smtClean="0"/>
+              <a:t> parameter.</a:t>
+            </a:r>
+          </a:p>
+          <a:p>
+            <a:endParaRPr lang="en-US" dirty="0"/>
+          </a:p>
+        </p:txBody>
+      </p:sp>
+      <p:sp>
+        <p:nvSpPr>
+          <p:cNvPr id="2" name="Title 1"/>
+          <p:cNvSpPr>
+            <a:spLocks noGrp="1"/>
+          </p:cNvSpPr>
+          <p:nvPr>
+            <p:ph type="title"/>
+          </p:nvPr>
+        </p:nvSpPr>
+        <p:spPr/>
+        <p:txBody>
+          <a:bodyPr/>
+          <a:lstStyle/>
+          <a:p>
+            <a:r>
+              <a:rPr lang="en-US" dirty="0" err="1" smtClean="0"/>
+              <a:t>Req</a:t>
+            </a:r>
+            <a:r>
+              <a:rPr lang="en-US" dirty="0" smtClean="0"/>
+              <a:t> properties</a:t>
+            </a:r>
+            <a:endParaRPr lang="en-US" dirty="0"/>
+          </a:p>
+        </p:txBody>
+      </p:sp>
+      <p:sp>
+        <p:nvSpPr>
+          <p:cNvPr id="4" name="Slide Number Placeholder 3"/>
+          <p:cNvSpPr>
+            <a:spLocks noGrp="1"/>
+          </p:cNvSpPr>
+          <p:nvPr>
+            <p:ph type="sldNum" sz="quarter" idx="4294967295"/>
+          </p:nvPr>
+        </p:nvSpPr>
+        <p:spPr>
+          <a:xfrm>
+            <a:off x="8237538" y="6553200"/>
+            <a:ext cx="906462" cy="457200"/>
+          </a:xfrm>
+          <a:prstGeom prst="rect">
+            <a:avLst/>
+          </a:prstGeom>
+        </p:spPr>
+        <p:txBody>
+          <a:bodyPr/>
+          <a:lstStyle/>
+          <a:p>
+            <a:fld id="{0D854ACF-EFF3-42D3-AB5F-408268493A1F}" type="slidenum">
+              <a:rPr lang="en-US" smtClean="0"/>
+              <a:pPr/>
+              <a:t>24</a:t>
+            </a:fld>
+            <a:endParaRPr lang="en-US" dirty="0"/>
+          </a:p>
+        </p:txBody>
+      </p:sp>
+      <p:graphicFrame>
+        <p:nvGraphicFramePr>
+          <p:cNvPr id="6" name="Table 5"/>
+          <p:cNvGraphicFramePr>
+            <a:graphicFrameLocks noGrp="1"/>
+          </p:cNvGraphicFramePr>
+          <p:nvPr>
+            <p:extLst>
+              <p:ext uri="{D42A27DB-BD31-4B8C-83A1-F6EECF244321}">
+                <p14:modId xmlns:p14="http://schemas.microsoft.com/office/powerpoint/2010/main" val="336651430"/>
+              </p:ext>
+            </p:extLst>
+          </p:nvPr>
+        </p:nvGraphicFramePr>
+        <p:xfrm>
+          <a:off x="685800" y="1924812"/>
+          <a:ext cx="7315200" cy="3337560"/>
+        </p:xfrm>
+        <a:graphic>
+          <a:graphicData uri="http://schemas.openxmlformats.org/drawingml/2006/table">
+            <a:tbl>
+              <a:tblPr firstRow="1" bandRow="1">
+                <a:tableStyleId>{5C22544A-7EE6-4342-B048-85BDC9FD1C3A}</a:tableStyleId>
+              </a:tblPr>
+              <a:tblGrid>
+                <a:gridCol w="2377440"/>
+                <a:gridCol w="4937760"/>
+              </a:tblGrid>
+              <a:tr h="370840">
+                <a:tc>
+                  <a:txBody>
+                    <a:bodyPr/>
+                    <a:lstStyle/>
+                    <a:p>
+                      <a:r>
+                        <a:rPr lang="en-US" dirty="0" smtClean="0"/>
+                        <a:t>Property</a:t>
+                      </a:r>
+                      <a:endParaRPr lang="en-US" dirty="0"/>
+                    </a:p>
+                  </a:txBody>
+                  <a:tcPr/>
+                </a:tc>
+                <a:tc>
+                  <a:txBody>
+                    <a:bodyPr/>
+                    <a:lstStyle/>
+                    <a:p>
+                      <a:r>
+                        <a:rPr lang="en-US" dirty="0" smtClean="0"/>
+                        <a:t>Meaning</a:t>
+                      </a:r>
+                      <a:endParaRPr lang="en-US" dirty="0"/>
+                    </a:p>
+                  </a:txBody>
+                  <a:tcPr/>
+                </a:tc>
+              </a:tr>
+              <a:tr h="370840">
+                <a:tc>
+                  <a:txBody>
+                    <a:bodyPr/>
+                    <a:lstStyle/>
+                    <a:p>
+                      <a:r>
+                        <a:rPr lang="en-US" dirty="0" err="1" smtClean="0"/>
+                        <a:t>req.app</a:t>
+                      </a:r>
+                      <a:endParaRPr lang="en-US" dirty="0"/>
+                    </a:p>
+                  </a:txBody>
+                  <a:tcPr/>
+                </a:tc>
+                <a:tc>
+                  <a:txBody>
+                    <a:bodyPr/>
+                    <a:lstStyle/>
+                    <a:p>
+                      <a:r>
+                        <a:rPr lang="en-US" dirty="0" smtClean="0"/>
+                        <a:t>Points to the express app</a:t>
+                      </a:r>
+                      <a:endParaRPr lang="en-US" dirty="0"/>
+                    </a:p>
+                  </a:txBody>
+                  <a:tcPr/>
+                </a:tc>
+              </a:tr>
+              <a:tr h="370840">
+                <a:tc>
+                  <a:txBody>
+                    <a:bodyPr/>
+                    <a:lstStyle/>
+                    <a:p>
+                      <a:pPr marL="0" marR="0" indent="0" algn="l" defTabSz="457200" rtl="0" eaLnBrk="1" fontAlgn="auto" latinLnBrk="0" hangingPunct="1">
+                        <a:lnSpc>
+                          <a:spcPct val="100000"/>
+                        </a:lnSpc>
+                        <a:spcBef>
+                          <a:spcPts val="0"/>
+                        </a:spcBef>
+                        <a:spcAft>
+                          <a:spcPts val="0"/>
+                        </a:spcAft>
+                        <a:buClrTx/>
+                        <a:buSzTx/>
+                        <a:buFontTx/>
+                        <a:buNone/>
+                        <a:tabLst/>
+                        <a:defRPr/>
+                      </a:pPr>
+                      <a:r>
+                        <a:rPr lang="en-US" dirty="0" err="1" smtClean="0"/>
+                        <a:t>req.body</a:t>
+                      </a:r>
+                      <a:endParaRPr lang="en-US" dirty="0" smtClean="0"/>
+                    </a:p>
+                  </a:txBody>
+                  <a:tcPr/>
+                </a:tc>
+                <a:tc>
+                  <a:txBody>
+                    <a:bodyPr/>
+                    <a:lstStyle/>
+                    <a:p>
+                      <a:r>
+                        <a:rPr lang="en-US" dirty="0" smtClean="0"/>
+                        <a:t>{ } of body properties</a:t>
+                      </a:r>
+                      <a:endParaRPr lang="en-US" dirty="0"/>
+                    </a:p>
+                  </a:txBody>
+                  <a:tcPr/>
+                </a:tc>
+              </a:tr>
+              <a:tr h="370840">
+                <a:tc>
+                  <a:txBody>
+                    <a:bodyPr/>
+                    <a:lstStyle/>
+                    <a:p>
+                      <a:pPr marL="0" marR="0" indent="0" algn="l" defTabSz="457200" rtl="0" eaLnBrk="1" fontAlgn="auto" latinLnBrk="0" hangingPunct="1">
+                        <a:lnSpc>
+                          <a:spcPct val="100000"/>
+                        </a:lnSpc>
+                        <a:spcBef>
+                          <a:spcPts val="0"/>
+                        </a:spcBef>
+                        <a:spcAft>
+                          <a:spcPts val="0"/>
+                        </a:spcAft>
+                        <a:buClrTx/>
+                        <a:buSzTx/>
+                        <a:buFontTx/>
+                        <a:buNone/>
+                        <a:tabLst/>
+                        <a:defRPr/>
+                      </a:pPr>
+                      <a:r>
+                        <a:rPr lang="en-US" dirty="0" err="1" smtClean="0"/>
+                        <a:t>req.query</a:t>
+                      </a:r>
+                      <a:endParaRPr lang="en-US" dirty="0" smtClean="0"/>
+                    </a:p>
+                  </a:txBody>
+                  <a:tcPr/>
+                </a:tc>
+                <a:tc>
+                  <a:txBody>
+                    <a:bodyPr/>
+                    <a:lstStyle/>
+                    <a:p>
+                      <a:r>
+                        <a:rPr lang="en-US" dirty="0" smtClean="0"/>
+                        <a:t>{ } of query parameters</a:t>
+                      </a:r>
+                      <a:endParaRPr lang="en-US" dirty="0"/>
+                    </a:p>
+                  </a:txBody>
+                  <a:tcPr/>
+                </a:tc>
+              </a:tr>
+              <a:tr h="370840">
+                <a:tc>
+                  <a:txBody>
+                    <a:bodyPr/>
+                    <a:lstStyle/>
+                    <a:p>
+                      <a:pPr marL="0" marR="0" indent="0" algn="l" defTabSz="457200" rtl="0" eaLnBrk="1" fontAlgn="auto" latinLnBrk="0" hangingPunct="1">
+                        <a:lnSpc>
+                          <a:spcPct val="100000"/>
+                        </a:lnSpc>
+                        <a:spcBef>
+                          <a:spcPts val="0"/>
+                        </a:spcBef>
+                        <a:spcAft>
+                          <a:spcPts val="0"/>
+                        </a:spcAft>
+                        <a:buClrTx/>
+                        <a:buSzTx/>
+                        <a:buFontTx/>
+                        <a:buNone/>
+                        <a:tabLst/>
+                        <a:defRPr/>
+                      </a:pPr>
+                      <a:r>
+                        <a:rPr lang="en-US" dirty="0" err="1" smtClean="0"/>
+                        <a:t>req.method</a:t>
+                      </a:r>
+                      <a:endParaRPr lang="en-US" dirty="0" smtClean="0"/>
+                    </a:p>
+                  </a:txBody>
+                  <a:tcPr/>
+                </a:tc>
+                <a:tc>
+                  <a:txBody>
+                    <a:bodyPr/>
+                    <a:lstStyle/>
+                    <a:p>
+                      <a:r>
+                        <a:rPr lang="en-US" dirty="0" smtClean="0"/>
+                        <a:t>String - HTTP Method</a:t>
+                      </a:r>
+                      <a:endParaRPr lang="en-US" dirty="0"/>
+                    </a:p>
+                  </a:txBody>
+                  <a:tcPr/>
+                </a:tc>
+              </a:tr>
+              <a:tr h="370840">
+                <a:tc>
+                  <a:txBody>
+                    <a:bodyPr/>
+                    <a:lstStyle/>
+                    <a:p>
+                      <a:r>
+                        <a:rPr lang="en-US" dirty="0" err="1" smtClean="0"/>
+                        <a:t>req.params</a:t>
+                      </a:r>
+                      <a:endParaRPr lang="en-US" dirty="0"/>
+                    </a:p>
+                  </a:txBody>
+                  <a:tcPr/>
+                </a:tc>
+                <a:tc>
+                  <a:txBody>
+                    <a:bodyPr/>
+                    <a:lstStyle/>
+                    <a:p>
+                      <a:r>
+                        <a:rPr lang="en-US" dirty="0" smtClean="0"/>
+                        <a:t>{ } hash of </a:t>
+                      </a:r>
+                      <a:r>
+                        <a:rPr lang="en-US" dirty="0" err="1" smtClean="0"/>
+                        <a:t>url</a:t>
+                      </a:r>
+                      <a:r>
+                        <a:rPr lang="en-US" dirty="0" smtClean="0"/>
+                        <a:t> parameters /users/:id</a:t>
+                      </a:r>
+                      <a:endParaRPr lang="en-US" dirty="0"/>
+                    </a:p>
+                  </a:txBody>
+                  <a:tcPr/>
+                </a:tc>
+              </a:tr>
+              <a:tr h="370840">
+                <a:tc>
+                  <a:txBody>
+                    <a:bodyPr/>
+                    <a:lstStyle/>
+                    <a:p>
+                      <a:r>
+                        <a:rPr lang="en-US" dirty="0" err="1" smtClean="0"/>
+                        <a:t>req.xhr</a:t>
+                      </a:r>
+                      <a:endParaRPr lang="en-US" dirty="0"/>
+                    </a:p>
+                  </a:txBody>
+                  <a:tcPr/>
+                </a:tc>
+                <a:tc>
+                  <a:txBody>
+                    <a:bodyPr/>
+                    <a:lstStyle/>
+                    <a:p>
+                      <a:r>
+                        <a:rPr lang="en-US" dirty="0" smtClean="0"/>
+                        <a:t>Boolean – based on header</a:t>
+                      </a:r>
+                      <a:endParaRPr lang="en-US" dirty="0"/>
+                    </a:p>
+                  </a:txBody>
+                  <a:tcPr/>
+                </a:tc>
+              </a:tr>
+              <a:tr h="370840">
+                <a:tc>
+                  <a:txBody>
+                    <a:bodyPr/>
+                    <a:lstStyle/>
+                    <a:p>
+                      <a:r>
+                        <a:rPr lang="en-US" dirty="0" err="1" smtClean="0"/>
+                        <a:t>req.cookies</a:t>
+                      </a:r>
+                      <a:endParaRPr lang="en-US" dirty="0"/>
+                    </a:p>
+                  </a:txBody>
+                  <a:tcPr/>
+                </a:tc>
+                <a:tc>
+                  <a:txBody>
+                    <a:bodyPr/>
+                    <a:lstStyle/>
+                    <a:p>
+                      <a:r>
+                        <a:rPr lang="en-US" dirty="0" smtClean="0"/>
+                        <a:t>{ } of cookie values</a:t>
+                      </a:r>
+                      <a:endParaRPr lang="en-US" dirty="0"/>
+                    </a:p>
+                  </a:txBody>
+                  <a:tcPr/>
+                </a:tc>
+              </a:tr>
+              <a:tr h="370840">
+                <a:tc>
+                  <a:txBody>
+                    <a:bodyPr/>
+                    <a:lstStyle/>
+                    <a:p>
+                      <a:r>
+                        <a:rPr lang="en-US" dirty="0" err="1" smtClean="0"/>
+                        <a:t>req.param</a:t>
+                      </a:r>
+                      <a:r>
+                        <a:rPr lang="en-US" dirty="0" smtClean="0"/>
+                        <a:t>(name)</a:t>
+                      </a:r>
+                      <a:endParaRPr lang="en-US" dirty="0"/>
+                    </a:p>
+                  </a:txBody>
+                  <a:tcPr/>
+                </a:tc>
+                <a:tc>
+                  <a:txBody>
+                    <a:bodyPr/>
+                    <a:lstStyle/>
+                    <a:p>
+                      <a:r>
+                        <a:rPr lang="en-US" dirty="0" smtClean="0"/>
+                        <a:t>Search query, </a:t>
+                      </a:r>
+                      <a:r>
+                        <a:rPr lang="en-US" dirty="0" err="1" smtClean="0"/>
+                        <a:t>params</a:t>
+                      </a:r>
+                      <a:r>
+                        <a:rPr lang="en-US" dirty="0" smtClean="0"/>
+                        <a:t>, body for property</a:t>
+                      </a:r>
+                      <a:endParaRPr lang="en-US" dirty="0"/>
+                    </a:p>
+                  </a:txBody>
+                  <a:tcPr/>
+                </a:tc>
+              </a:tr>
+            </a:tbl>
+          </a:graphicData>
+        </a:graphic>
+      </p:graphicFrame>
+    </p:spTree>
+    <p:extLst>
+      <p:ext uri="{BB962C8B-B14F-4D97-AF65-F5344CB8AC3E}">
+        <p14:creationId xmlns:p14="http://schemas.microsoft.com/office/powerpoint/2010/main" val="453461712"/>
+      </p:ext>
+    </p:extLst>
+  </p:cSld>
+  <p:clrMapOvr>
+    <a:masterClrMapping/>
+  </p:clrMapOvr>
+  <mc:AlternateContent xmlns:mc="http://schemas.openxmlformats.org/markup-compatibility/2006" xmlns:p14="http://schemas.microsoft.com/office/powerpoint/2010/main">
+    <mc:Choice Requires="p14">
+      <p:transition p14:dur="0"/>
+    </mc:Choice>
+    <mc:Fallback xmlns="">
+      <p:transition/>
+    </mc:Fallback>
+  </mc:AlternateContent>
+  <p:timing>
+    <p:tnLst>
+      <p:par>
+        <p:cTn id="1" dur="indefinite" restart="never" nodeType="tmRoot"/>
+      </p:par>
+    </p:tnLst>
+  </p:timing>
+</p:sld>
+</file>
+
+<file path=ppt/slides/slide25.xml><?xml version="1.0" encoding="utf-8"?>
+<p:sld xmlns:a="http://schemas.openxmlformats.org/drawingml/2006/main" xmlns:r="http://schemas.openxmlformats.org/officeDocument/2006/relationships" xmlns:p="http://schemas.openxmlformats.org/presentationml/2006/main">
+  <p:cSld>
+    <p:spTree>
+      <p:nvGrpSpPr>
+        <p:cNvPr id="1" name=""/>
+        <p:cNvGrpSpPr/>
+        <p:nvPr/>
+      </p:nvGrpSpPr>
+      <p:grpSpPr>
+        <a:xfrm>
+          <a:off x="0" y="0"/>
+          <a:ext cx="0" cy="0"/>
+          <a:chOff x="0" y="0"/>
+          <a:chExt cx="0" cy="0"/>
+        </a:xfrm>
+      </p:grpSpPr>
+      <p:sp>
+        <p:nvSpPr>
+          <p:cNvPr id="3" name="Content Placeholder 2"/>
+          <p:cNvSpPr>
+            <a:spLocks noGrp="1"/>
+          </p:cNvSpPr>
+          <p:nvPr>
+            <p:ph type="body" sz="quarter" idx="12"/>
+          </p:nvPr>
+        </p:nvSpPr>
+        <p:spPr/>
+        <p:txBody>
+          <a:bodyPr/>
+          <a:lstStyle/>
+          <a:p>
+            <a:r>
+              <a:rPr lang="en-US" dirty="0" smtClean="0"/>
+              <a:t>These are properties on the res parameter.</a:t>
+            </a:r>
+          </a:p>
+          <a:p>
+            <a:endParaRPr lang="en-US" dirty="0"/>
+          </a:p>
+        </p:txBody>
+      </p:sp>
+      <p:sp>
+        <p:nvSpPr>
+          <p:cNvPr id="2" name="Title 1"/>
+          <p:cNvSpPr>
+            <a:spLocks noGrp="1"/>
+          </p:cNvSpPr>
+          <p:nvPr>
+            <p:ph type="title"/>
+          </p:nvPr>
+        </p:nvSpPr>
+        <p:spPr/>
+        <p:txBody>
+          <a:bodyPr/>
+          <a:lstStyle/>
+          <a:p>
+            <a:r>
+              <a:rPr lang="en-US" dirty="0" smtClean="0"/>
+              <a:t>Res properties</a:t>
+            </a:r>
+            <a:endParaRPr lang="en-US" dirty="0"/>
+          </a:p>
+        </p:txBody>
+      </p:sp>
+      <p:sp>
+        <p:nvSpPr>
+          <p:cNvPr id="4" name="Slide Number Placeholder 3"/>
+          <p:cNvSpPr>
+            <a:spLocks noGrp="1"/>
+          </p:cNvSpPr>
+          <p:nvPr>
+            <p:ph type="sldNum" sz="quarter" idx="4294967295"/>
+          </p:nvPr>
+        </p:nvSpPr>
+        <p:spPr>
+          <a:xfrm>
+            <a:off x="8237538" y="6553200"/>
+            <a:ext cx="906462" cy="457200"/>
+          </a:xfrm>
+          <a:prstGeom prst="rect">
+            <a:avLst/>
+          </a:prstGeom>
+        </p:spPr>
+        <p:txBody>
+          <a:bodyPr/>
+          <a:lstStyle/>
+          <a:p>
+            <a:fld id="{0D854ACF-EFF3-42D3-AB5F-408268493A1F}" type="slidenum">
+              <a:rPr lang="en-US" smtClean="0"/>
+              <a:pPr/>
+              <a:t>25</a:t>
+            </a:fld>
+            <a:endParaRPr lang="en-US" dirty="0"/>
+          </a:p>
+        </p:txBody>
+      </p:sp>
+      <p:graphicFrame>
+        <p:nvGraphicFramePr>
+          <p:cNvPr id="6" name="Table 5"/>
+          <p:cNvGraphicFramePr>
+            <a:graphicFrameLocks noGrp="1"/>
+          </p:cNvGraphicFramePr>
+          <p:nvPr>
+            <p:extLst>
+              <p:ext uri="{D42A27DB-BD31-4B8C-83A1-F6EECF244321}">
+                <p14:modId xmlns:p14="http://schemas.microsoft.com/office/powerpoint/2010/main" val="908295871"/>
+              </p:ext>
+            </p:extLst>
+          </p:nvPr>
+        </p:nvGraphicFramePr>
+        <p:xfrm>
+          <a:off x="685800" y="1924812"/>
+          <a:ext cx="6096000" cy="1112520"/>
+        </p:xfrm>
+        <a:graphic>
+          <a:graphicData uri="http://schemas.openxmlformats.org/drawingml/2006/table">
+            <a:tbl>
+              <a:tblPr firstRow="1" bandRow="1">
+                <a:tableStyleId>{5C22544A-7EE6-4342-B048-85BDC9FD1C3A}</a:tableStyleId>
+              </a:tblPr>
+              <a:tblGrid>
+                <a:gridCol w="1981200"/>
+                <a:gridCol w="4114800"/>
+              </a:tblGrid>
+              <a:tr h="370840">
+                <a:tc>
+                  <a:txBody>
+                    <a:bodyPr/>
+                    <a:lstStyle/>
+                    <a:p>
+                      <a:r>
+                        <a:rPr lang="en-US" dirty="0" smtClean="0"/>
+                        <a:t>Property</a:t>
+                      </a:r>
+                      <a:endParaRPr lang="en-US" dirty="0"/>
+                    </a:p>
+                  </a:txBody>
+                  <a:tcPr/>
+                </a:tc>
+                <a:tc>
+                  <a:txBody>
+                    <a:bodyPr/>
+                    <a:lstStyle/>
+                    <a:p>
+                      <a:r>
+                        <a:rPr lang="en-US" dirty="0" smtClean="0"/>
+                        <a:t>Meaning</a:t>
+                      </a:r>
+                      <a:endParaRPr lang="en-US" dirty="0"/>
+                    </a:p>
+                  </a:txBody>
+                  <a:tcPr/>
+                </a:tc>
+              </a:tr>
+              <a:tr h="370840">
+                <a:tc>
+                  <a:txBody>
+                    <a:bodyPr/>
+                    <a:lstStyle/>
+                    <a:p>
+                      <a:r>
+                        <a:rPr lang="en-US" dirty="0" err="1" smtClean="0"/>
+                        <a:t>res.app</a:t>
+                      </a:r>
+                      <a:endParaRPr lang="en-US" dirty="0"/>
+                    </a:p>
+                  </a:txBody>
+                  <a:tcPr/>
+                </a:tc>
+                <a:tc>
+                  <a:txBody>
+                    <a:bodyPr/>
+                    <a:lstStyle/>
+                    <a:p>
+                      <a:r>
+                        <a:rPr lang="en-US" dirty="0" smtClean="0"/>
+                        <a:t>Points to the express app</a:t>
+                      </a:r>
+                      <a:endParaRPr lang="en-US" dirty="0"/>
+                    </a:p>
+                  </a:txBody>
+                  <a:tcPr/>
+                </a:tc>
+              </a:tr>
+              <a:tr h="370840">
+                <a:tc>
+                  <a:txBody>
+                    <a:bodyPr/>
+                    <a:lstStyle/>
+                    <a:p>
+                      <a:pPr marL="0" marR="0" indent="0" algn="l" defTabSz="457200" rtl="0" eaLnBrk="1" fontAlgn="auto" latinLnBrk="0" hangingPunct="1">
+                        <a:lnSpc>
+                          <a:spcPct val="100000"/>
+                        </a:lnSpc>
+                        <a:spcBef>
+                          <a:spcPts val="0"/>
+                        </a:spcBef>
+                        <a:spcAft>
+                          <a:spcPts val="0"/>
+                        </a:spcAft>
+                        <a:buClrTx/>
+                        <a:buSzTx/>
+                        <a:buFontTx/>
+                        <a:buNone/>
+                        <a:tabLst/>
+                        <a:defRPr/>
+                      </a:pPr>
+                      <a:r>
+                        <a:rPr lang="en-US" dirty="0" err="1" smtClean="0"/>
+                        <a:t>res.locals</a:t>
+                      </a:r>
+                      <a:endParaRPr lang="en-US" dirty="0" smtClean="0"/>
+                    </a:p>
+                  </a:txBody>
+                  <a:tcPr/>
+                </a:tc>
+                <a:tc>
+                  <a:txBody>
+                    <a:bodyPr/>
+                    <a:lstStyle/>
+                    <a:p>
+                      <a:r>
+                        <a:rPr lang="en-US" dirty="0" smtClean="0"/>
+                        <a:t>{ } of</a:t>
+                      </a:r>
+                      <a:r>
+                        <a:rPr lang="en-US" baseline="0" dirty="0" smtClean="0"/>
+                        <a:t> properties avail for this page</a:t>
+                      </a:r>
+                      <a:endParaRPr lang="en-US" dirty="0"/>
+                    </a:p>
+                  </a:txBody>
+                  <a:tcPr/>
+                </a:tc>
+              </a:tr>
+            </a:tbl>
+          </a:graphicData>
+        </a:graphic>
+      </p:graphicFrame>
+    </p:spTree>
+    <p:extLst>
+      <p:ext uri="{BB962C8B-B14F-4D97-AF65-F5344CB8AC3E}">
+        <p14:creationId xmlns:p14="http://schemas.microsoft.com/office/powerpoint/2010/main" val="663478478"/>
+      </p:ext>
+    </p:extLst>
+  </p:cSld>
+  <p:clrMapOvr>
+    <a:masterClrMapping/>
+  </p:clrMapOvr>
+  <mc:AlternateContent xmlns:mc="http://schemas.openxmlformats.org/markup-compatibility/2006" xmlns:p14="http://schemas.microsoft.com/office/powerpoint/2010/main">
+    <mc:Choice Requires="p14">
+      <p:transition p14:dur="0"/>
+    </mc:Choice>
+    <mc:Fallback xmlns="">
+      <p:transition/>
+    </mc:Fallback>
+  </mc:AlternateContent>
+  <p:timing>
+    <p:tnLst>
+      <p:par>
+        <p:cTn id="1" dur="indefinite" restart="never" nodeType="tmRoot"/>
+      </p:par>
+    </p:tnLst>
+  </p:timing>
+</p:sld>
+</file>
+
+<file path=ppt/slides/slide26.xml><?xml version="1.0" encoding="utf-8"?>
 <p:sld xmlns:a="http://schemas.openxmlformats.org/drawingml/2006/main" xmlns:r="http://schemas.openxmlformats.org/officeDocument/2006/relationships" xmlns:p="http://schemas.openxmlformats.org/presentationml/2006/main">
   <p:cSld>
     <p:spTree>
@@ -9908,7 +10946,7 @@
               <a:pPr>
                 <a:defRPr/>
               </a:pPr>
-              <a:t>23</a:t>
+              <a:t>26</a:t>
             </a:fld>
             <a:endParaRPr lang="en-US"/>
           </a:p>
@@ -9935,7 +10973,7 @@
   <p:timing>
     <p:tnLst>
       <p:par>
-        <p:cTn xmlns:p14="http://schemas.microsoft.com/office/powerpoint/2010/main" id="1" dur="indefinite" restart="never" nodeType="tmRoot"/>
+        <p:cTn id="1" dur="indefinite" restart="never" nodeType="tmRoot"/>
       </p:par>
     </p:tnLst>
   </p:timing>
@@ -10078,7 +11116,7 @@
   <p:timing>
     <p:tnLst>
       <p:par>
-        <p:cTn xmlns:p14="http://schemas.microsoft.com/office/powerpoint/2010/main" id="1" dur="indefinite" restart="never" nodeType="tmRoot"/>
+        <p:cTn id="1" dur="indefinite" restart="never" nodeType="tmRoot"/>
       </p:par>
     </p:tnLst>
   </p:timing>
@@ -10215,7 +11253,7 @@
   <p:timing>
     <p:tnLst>
       <p:par>
-        <p:cTn xmlns:p14="http://schemas.microsoft.com/office/powerpoint/2010/main" id="1" dur="indefinite" restart="never" nodeType="tmRoot"/>
+        <p:cTn id="1" dur="indefinite" restart="never" nodeType="tmRoot"/>
       </p:par>
     </p:tnLst>
   </p:timing>
@@ -10583,7 +11621,7 @@
   <p:timing>
     <p:tnLst>
       <p:par>
-        <p:cTn xmlns:p14="http://schemas.microsoft.com/office/powerpoint/2010/main" id="1" dur="indefinite" restart="never" nodeType="tmRoot"/>
+        <p:cTn id="1" dur="indefinite" restart="never" nodeType="tmRoot"/>
       </p:par>
     </p:tnLst>
   </p:timing>
@@ -10745,7 +11783,7 @@
   <p:timing>
     <p:tnLst>
       <p:par>
-        <p:cTn xmlns:p14="http://schemas.microsoft.com/office/powerpoint/2010/main" id="1" dur="indefinite" restart="never" nodeType="tmRoot"/>
+        <p:cTn id="1" dur="indefinite" restart="never" nodeType="tmRoot"/>
       </p:par>
     </p:tnLst>
   </p:timing>
@@ -11681,7 +12719,7 @@
   <p:timing>
     <p:tnLst>
       <p:par>
-        <p:cTn xmlns:p14="http://schemas.microsoft.com/office/powerpoint/2010/main" id="1" dur="indefinite" restart="never" nodeType="tmRoot"/>
+        <p:cTn id="1" dur="indefinite" restart="never" nodeType="tmRoot"/>
       </p:par>
     </p:tnLst>
   </p:timing>
@@ -11945,7 +12983,7 @@
   <p:timing>
     <p:tnLst>
       <p:par>
-        <p:cTn xmlns:p14="http://schemas.microsoft.com/office/powerpoint/2010/main" id="1" dur="indefinite" restart="never" nodeType="tmRoot"/>
+        <p:cTn id="1" dur="indefinite" restart="never" nodeType="tmRoot"/>
       </p:par>
     </p:tnLst>
   </p:timing>
@@ -12890,7 +13928,7 @@
   <p:timing>
     <p:tnLst>
       <p:par>
-        <p:cTn xmlns:p14="http://schemas.microsoft.com/office/powerpoint/2010/main" id="1" dur="indefinite" restart="never" nodeType="tmRoot"/>
+        <p:cTn id="1" dur="indefinite" restart="never" nodeType="tmRoot"/>
       </p:par>
     </p:tnLst>
   </p:timing>

</xml_diff>